<commit_message>
#22 update mockup categories
</commit_message>
<xml_diff>
--- a/docs/mockup..pptx
+++ b/docs/mockup..pptx
@@ -3810,8 +3810,8 @@
         </p:nvSpPr>
         <p:spPr>
           <a:xfrm>
-            <a:off x="181895" y="1107452"/>
-            <a:ext cx="10776155" cy="5750548"/>
+            <a:off x="181895" y="884903"/>
+            <a:ext cx="10776155" cy="5973097"/>
           </a:xfrm>
           <a:prstGeom prst="rect">
             <a:avLst/>
@@ -3901,7 +3901,7 @@
         </p:nvSpPr>
         <p:spPr>
           <a:xfrm>
-            <a:off x="3624469" y="451695"/>
+            <a:off x="3624469" y="0"/>
             <a:ext cx="4943062" cy="767765"/>
           </a:xfrm>
           <a:prstGeom prst="rect">
@@ -3941,73 +3941,63 @@
       </p:sp>
       <p:sp>
         <p:nvSpPr>
-          <p:cNvPr id="6" name="Title 1">
-            <a:extLst>
-              <a:ext uri="{FF2B5EF4-FFF2-40B4-BE49-F238E27FC236}">
-                <a16:creationId xmlns:a16="http://schemas.microsoft.com/office/drawing/2014/main" id="{809C1E52-CDD1-453C-8065-3AF582A35D39}"/>
-              </a:ext>
-            </a:extLst>
-          </p:cNvPr>
-          <p:cNvSpPr>
-            <a:spLocks noGrp="1"/>
-          </p:cNvSpPr>
-          <p:nvPr>
-            <p:ph type="title"/>
-          </p:nvPr>
+          <p:cNvPr id="3" name="Rectangle 2">
+            <a:extLst>
+              <a:ext uri="{FF2B5EF4-FFF2-40B4-BE49-F238E27FC236}">
+                <a16:creationId xmlns:a16="http://schemas.microsoft.com/office/drawing/2014/main" id="{03CB3E43-8548-4728-9010-9A2633F9B5F2}"/>
+              </a:ext>
+            </a:extLst>
+          </p:cNvPr>
+          <p:cNvSpPr/>
+          <p:nvPr/>
         </p:nvSpPr>
         <p:spPr>
           <a:xfrm>
-            <a:off x="3756991" y="1219460"/>
-            <a:ext cx="4267200" cy="767764"/>
-          </a:xfrm>
-        </p:spPr>
-        <p:txBody>
-          <a:bodyPr>
-            <a:normAutofit/>
-          </a:bodyPr>
-          <a:lstStyle/>
-          <a:p>
-            <a:r>
-              <a:rPr lang="en-US" sz="2000" dirty="0">
-                <a:solidFill>
-                  <a:srgbClr val="FF0000"/>
-                </a:solidFill>
-              </a:rPr>
-              <a:t>Mockup on My Categories</a:t>
-            </a:r>
-          </a:p>
-        </p:txBody>
-      </p:sp>
-      <p:pic>
-        <p:nvPicPr>
-          <p:cNvPr id="8" name="Picture 7">
-            <a:extLst>
-              <a:ext uri="{FF2B5EF4-FFF2-40B4-BE49-F238E27FC236}">
-                <a16:creationId xmlns:a16="http://schemas.microsoft.com/office/drawing/2014/main" id="{318BAB04-4438-488A-9F80-27B43A2D05D6}"/>
-              </a:ext>
-            </a:extLst>
-          </p:cNvPr>
-          <p:cNvPicPr>
-            <a:picLocks noChangeAspect="1"/>
-          </p:cNvPicPr>
-          <p:nvPr/>
-        </p:nvPicPr>
-        <p:blipFill>
-          <a:blip r:embed="rId2"/>
-          <a:stretch>
-            <a:fillRect/>
-          </a:stretch>
-        </p:blipFill>
-        <p:spPr>
-          <a:xfrm>
-            <a:off x="2727670" y="1885950"/>
-            <a:ext cx="6736660" cy="4667250"/>
+            <a:off x="412955" y="767766"/>
+            <a:ext cx="11562735" cy="5795266"/>
           </a:xfrm>
           <a:prstGeom prst="rect">
             <a:avLst/>
           </a:prstGeom>
+          <a:blipFill dpi="0" rotWithShape="1">
+            <a:blip r:embed="rId2">
+              <a:extLst>
+                <a:ext uri="{28A0092B-C50C-407E-A947-70E740481C1C}">
+                  <a14:useLocalDpi xmlns:a14="http://schemas.microsoft.com/office/drawing/2010/main" val="0"/>
+                </a:ext>
+              </a:extLst>
+            </a:blip>
+            <a:srcRect/>
+            <a:stretch>
+              <a:fillRect/>
+            </a:stretch>
+          </a:blipFill>
         </p:spPr>
-      </p:pic>
+        <p:style>
+          <a:lnRef idx="2">
+            <a:schemeClr val="accent1">
+              <a:shade val="50000"/>
+            </a:schemeClr>
+          </a:lnRef>
+          <a:fillRef idx="1">
+            <a:schemeClr val="accent1"/>
+          </a:fillRef>
+          <a:effectRef idx="0">
+            <a:schemeClr val="accent1"/>
+          </a:effectRef>
+          <a:fontRef idx="minor">
+            <a:schemeClr val="lt1"/>
+          </a:fontRef>
+        </p:style>
+        <p:txBody>
+          <a:bodyPr rtlCol="0" anchor="ctr"/>
+          <a:lstStyle/>
+          <a:p>
+            <a:pPr algn="ctr"/>
+            <a:endParaRPr lang="en-US"/>
+          </a:p>
+        </p:txBody>
+      </p:sp>
     </p:spTree>
     <p:extLst>
       <p:ext uri="{BB962C8B-B14F-4D97-AF65-F5344CB8AC3E}">

</xml_diff>